<commit_message>
model refinement and ppt update
</commit_message>
<xml_diff>
--- a/docs/presentation_v1.0.pptx
+++ b/docs/presentation_v1.0.pptx
@@ -5,10 +5,10 @@
     <p:sldMasterId id="2147483650" r:id="rId4"/>
   </p:sldMasterIdLst>
   <p:notesMasterIdLst>
-    <p:notesMasterId r:id="rId21"/>
+    <p:notesMasterId r:id="rId23"/>
   </p:notesMasterIdLst>
   <p:handoutMasterIdLst>
-    <p:handoutMasterId r:id="rId22"/>
+    <p:handoutMasterId r:id="rId24"/>
   </p:handoutMasterIdLst>
   <p:sldIdLst>
     <p:sldId id="312" r:id="rId5"/>
@@ -19,14 +19,16 @@
     <p:sldId id="282" r:id="rId10"/>
     <p:sldId id="315" r:id="rId11"/>
     <p:sldId id="325" r:id="rId12"/>
-    <p:sldId id="314" r:id="rId13"/>
-    <p:sldId id="323" r:id="rId14"/>
-    <p:sldId id="317" r:id="rId15"/>
-    <p:sldId id="318" r:id="rId16"/>
-    <p:sldId id="319" r:id="rId17"/>
-    <p:sldId id="321" r:id="rId18"/>
-    <p:sldId id="322" r:id="rId19"/>
-    <p:sldId id="297" r:id="rId20"/>
+    <p:sldId id="326" r:id="rId13"/>
+    <p:sldId id="327" r:id="rId14"/>
+    <p:sldId id="314" r:id="rId15"/>
+    <p:sldId id="323" r:id="rId16"/>
+    <p:sldId id="317" r:id="rId17"/>
+    <p:sldId id="318" r:id="rId18"/>
+    <p:sldId id="319" r:id="rId19"/>
+    <p:sldId id="321" r:id="rId20"/>
+    <p:sldId id="322" r:id="rId21"/>
+    <p:sldId id="297" r:id="rId22"/>
   </p:sldIdLst>
   <p:sldSz cx="12192000" cy="6858000"/>
   <p:notesSz cx="13716000" cy="24384000"/>
@@ -705,7 +707,7 @@
     </p:spTree>
     <p:extLst>
       <p:ext uri="{BB962C8B-B14F-4D97-AF65-F5344CB8AC3E}">
-        <p14:creationId xmlns:p14="http://schemas.microsoft.com/office/powerpoint/2010/main" val="177914689"/>
+        <p14:creationId xmlns:p14="http://schemas.microsoft.com/office/powerpoint/2010/main" val="87667087"/>
       </p:ext>
     </p:extLst>
   </p:cSld>
@@ -720,7 +722,13 @@
   <p:cSld>
     <p:spTree>
       <p:nvGrpSpPr>
-        <p:cNvPr id="1" name=""/>
+        <p:cNvPr id="1" name="">
+          <a:extLst>
+            <a:ext uri="{FF2B5EF4-FFF2-40B4-BE49-F238E27FC236}">
+              <a16:creationId xmlns:a16="http://schemas.microsoft.com/office/drawing/2014/main" id="{FAD0BEF7-6357-38EA-5E62-D0FD2CB6EF1B}"/>
+            </a:ext>
+          </a:extLst>
+        </p:cNvPr>
         <p:cNvGrpSpPr/>
         <p:nvPr/>
       </p:nvGrpSpPr>
@@ -734,7 +742,13 @@
       </p:grpSpPr>
       <p:sp>
         <p:nvSpPr>
-          <p:cNvPr id="2" name="Slide Image Placeholder 1"/>
+          <p:cNvPr id="2" name="Slide Image Placeholder 1">
+            <a:extLst>
+              <a:ext uri="{FF2B5EF4-FFF2-40B4-BE49-F238E27FC236}">
+                <a16:creationId xmlns:a16="http://schemas.microsoft.com/office/drawing/2014/main" id="{CE7E49EF-EDF8-DA7F-6842-F09BC2B03DC5}"/>
+              </a:ext>
+            </a:extLst>
+          </p:cNvPr>
           <p:cNvSpPr>
             <a:spLocks noGrp="1" noRot="1" noChangeAspect="1"/>
           </p:cNvSpPr>
@@ -760,7 +774,13 @@
       </p:sp>
       <p:sp>
         <p:nvSpPr>
-          <p:cNvPr id="3" name="Notes Placeholder 2"/>
+          <p:cNvPr id="3" name="Notes Placeholder 2">
+            <a:extLst>
+              <a:ext uri="{FF2B5EF4-FFF2-40B4-BE49-F238E27FC236}">
+                <a16:creationId xmlns:a16="http://schemas.microsoft.com/office/drawing/2014/main" id="{BC6D11B8-14E6-6B9D-B736-10AEE0373B2C}"/>
+              </a:ext>
+            </a:extLst>
+          </p:cNvPr>
           <p:cNvSpPr>
             <a:spLocks noGrp="1"/>
           </p:cNvSpPr>
@@ -788,7 +808,7 @@
     </p:spTree>
     <p:extLst>
       <p:ext uri="{BB962C8B-B14F-4D97-AF65-F5344CB8AC3E}">
-        <p14:creationId xmlns:p14="http://schemas.microsoft.com/office/powerpoint/2010/main" val="984541709"/>
+        <p14:creationId xmlns:p14="http://schemas.microsoft.com/office/powerpoint/2010/main" val="2407500314"/>
       </p:ext>
     </p:extLst>
   </p:cSld>
@@ -871,7 +891,7 @@
     </p:spTree>
     <p:extLst>
       <p:ext uri="{BB962C8B-B14F-4D97-AF65-F5344CB8AC3E}">
-        <p14:creationId xmlns:p14="http://schemas.microsoft.com/office/powerpoint/2010/main" val="4110138705"/>
+        <p14:creationId xmlns:p14="http://schemas.microsoft.com/office/powerpoint/2010/main" val="177914689"/>
       </p:ext>
     </p:extLst>
   </p:cSld>
@@ -954,7 +974,7 @@
     </p:spTree>
     <p:extLst>
       <p:ext uri="{BB962C8B-B14F-4D97-AF65-F5344CB8AC3E}">
-        <p14:creationId xmlns:p14="http://schemas.microsoft.com/office/powerpoint/2010/main" val="3047668310"/>
+        <p14:creationId xmlns:p14="http://schemas.microsoft.com/office/powerpoint/2010/main" val="984541709"/>
       </p:ext>
     </p:extLst>
   </p:cSld>
@@ -1037,6 +1057,172 @@
     </p:spTree>
     <p:extLst>
       <p:ext uri="{BB962C8B-B14F-4D97-AF65-F5344CB8AC3E}">
+        <p14:creationId xmlns:p14="http://schemas.microsoft.com/office/powerpoint/2010/main" val="4110138705"/>
+      </p:ext>
+    </p:extLst>
+  </p:cSld>
+  <p:clrMapOvr>
+    <a:masterClrMapping/>
+  </p:clrMapOvr>
+</p:notes>
+</file>
+
+<file path=ppt/notesSlides/notesSlide15.xml><?xml version="1.0" encoding="utf-8"?>
+<p:notes xmlns:a="http://schemas.openxmlformats.org/drawingml/2006/main" xmlns:r="http://schemas.openxmlformats.org/officeDocument/2006/relationships" xmlns:p="http://schemas.openxmlformats.org/presentationml/2006/main">
+  <p:cSld>
+    <p:spTree>
+      <p:nvGrpSpPr>
+        <p:cNvPr id="1" name=""/>
+        <p:cNvGrpSpPr/>
+        <p:nvPr/>
+      </p:nvGrpSpPr>
+      <p:grpSpPr>
+        <a:xfrm>
+          <a:off x="0" y="0"/>
+          <a:ext cx="0" cy="0"/>
+          <a:chOff x="0" y="0"/>
+          <a:chExt cx="0" cy="0"/>
+        </a:xfrm>
+      </p:grpSpPr>
+      <p:sp>
+        <p:nvSpPr>
+          <p:cNvPr id="2" name="Slide Image Placeholder 1"/>
+          <p:cNvSpPr>
+            <a:spLocks noGrp="1" noRot="1" noChangeAspect="1"/>
+          </p:cNvSpPr>
+          <p:nvPr>
+            <p:ph type="sldImg"/>
+          </p:nvPr>
+        </p:nvSpPr>
+        <p:spPr>
+          <a:xfrm>
+            <a:off x="-457200" y="3048000"/>
+            <a:ext cx="14630400" cy="8229600"/>
+          </a:xfrm>
+          <a:prstGeom prst="rect">
+            <a:avLst/>
+          </a:prstGeom>
+          <a:noFill/>
+          <a:ln w="12700">
+            <a:solidFill>
+              <a:prstClr val="black"/>
+            </a:solidFill>
+          </a:ln>
+        </p:spPr>
+      </p:sp>
+      <p:sp>
+        <p:nvSpPr>
+          <p:cNvPr id="3" name="Notes Placeholder 2"/>
+          <p:cNvSpPr>
+            <a:spLocks noGrp="1"/>
+          </p:cNvSpPr>
+          <p:nvPr>
+            <p:ph type="body" idx="1"/>
+          </p:nvPr>
+        </p:nvSpPr>
+        <p:spPr>
+          <a:xfrm>
+            <a:off x="1371600" y="11734800"/>
+            <a:ext cx="10972800" cy="9601200"/>
+          </a:xfrm>
+          <a:prstGeom prst="rect">
+            <a:avLst/>
+          </a:prstGeom>
+        </p:spPr>
+        <p:txBody>
+          <a:bodyPr/>
+          <a:lstStyle/>
+          <a:p>
+            <a:endParaRPr lang="en-US" dirty="0"/>
+          </a:p>
+        </p:txBody>
+      </p:sp>
+    </p:spTree>
+    <p:extLst>
+      <p:ext uri="{BB962C8B-B14F-4D97-AF65-F5344CB8AC3E}">
+        <p14:creationId xmlns:p14="http://schemas.microsoft.com/office/powerpoint/2010/main" val="3047668310"/>
+      </p:ext>
+    </p:extLst>
+  </p:cSld>
+  <p:clrMapOvr>
+    <a:masterClrMapping/>
+  </p:clrMapOvr>
+</p:notes>
+</file>
+
+<file path=ppt/notesSlides/notesSlide16.xml><?xml version="1.0" encoding="utf-8"?>
+<p:notes xmlns:a="http://schemas.openxmlformats.org/drawingml/2006/main" xmlns:r="http://schemas.openxmlformats.org/officeDocument/2006/relationships" xmlns:p="http://schemas.openxmlformats.org/presentationml/2006/main">
+  <p:cSld>
+    <p:spTree>
+      <p:nvGrpSpPr>
+        <p:cNvPr id="1" name=""/>
+        <p:cNvGrpSpPr/>
+        <p:nvPr/>
+      </p:nvGrpSpPr>
+      <p:grpSpPr>
+        <a:xfrm>
+          <a:off x="0" y="0"/>
+          <a:ext cx="0" cy="0"/>
+          <a:chOff x="0" y="0"/>
+          <a:chExt cx="0" cy="0"/>
+        </a:xfrm>
+      </p:grpSpPr>
+      <p:sp>
+        <p:nvSpPr>
+          <p:cNvPr id="2" name="Slide Image Placeholder 1"/>
+          <p:cNvSpPr>
+            <a:spLocks noGrp="1" noRot="1" noChangeAspect="1"/>
+          </p:cNvSpPr>
+          <p:nvPr>
+            <p:ph type="sldImg"/>
+          </p:nvPr>
+        </p:nvSpPr>
+        <p:spPr>
+          <a:xfrm>
+            <a:off x="-457200" y="3048000"/>
+            <a:ext cx="14630400" cy="8229600"/>
+          </a:xfrm>
+          <a:prstGeom prst="rect">
+            <a:avLst/>
+          </a:prstGeom>
+          <a:noFill/>
+          <a:ln w="12700">
+            <a:solidFill>
+              <a:prstClr val="black"/>
+            </a:solidFill>
+          </a:ln>
+        </p:spPr>
+      </p:sp>
+      <p:sp>
+        <p:nvSpPr>
+          <p:cNvPr id="3" name="Notes Placeholder 2"/>
+          <p:cNvSpPr>
+            <a:spLocks noGrp="1"/>
+          </p:cNvSpPr>
+          <p:nvPr>
+            <p:ph type="body" idx="1"/>
+          </p:nvPr>
+        </p:nvSpPr>
+        <p:spPr>
+          <a:xfrm>
+            <a:off x="1371600" y="11734800"/>
+            <a:ext cx="10972800" cy="9601200"/>
+          </a:xfrm>
+          <a:prstGeom prst="rect">
+            <a:avLst/>
+          </a:prstGeom>
+        </p:spPr>
+        <p:txBody>
+          <a:bodyPr/>
+          <a:lstStyle/>
+          <a:p>
+            <a:endParaRPr lang="en-US" dirty="0"/>
+          </a:p>
+        </p:txBody>
+      </p:sp>
+    </p:spTree>
+    <p:extLst>
+      <p:ext uri="{BB962C8B-B14F-4D97-AF65-F5344CB8AC3E}">
         <p14:creationId xmlns:p14="http://schemas.microsoft.com/office/powerpoint/2010/main" val="2508814883"/>
       </p:ext>
     </p:extLst>
@@ -1047,7 +1233,7 @@
 </p:notes>
 </file>
 
-<file path=ppt/notesSlides/notesSlide15.xml><?xml version="1.0" encoding="utf-8"?>
+<file path=ppt/notesSlides/notesSlide17.xml><?xml version="1.0" encoding="utf-8"?>
 <p:notes xmlns:a="http://schemas.openxmlformats.org/drawingml/2006/main" xmlns:r="http://schemas.openxmlformats.org/officeDocument/2006/relationships" xmlns:p="http://schemas.openxmlformats.org/presentationml/2006/main">
   <p:cSld>
     <p:spTree>
@@ -1651,93 +1837,10 @@
   <p:cSld>
     <p:spTree>
       <p:nvGrpSpPr>
-        <p:cNvPr id="1" name=""/>
-        <p:cNvGrpSpPr/>
-        <p:nvPr/>
-      </p:nvGrpSpPr>
-      <p:grpSpPr>
-        <a:xfrm>
-          <a:off x="0" y="0"/>
-          <a:ext cx="0" cy="0"/>
-          <a:chOff x="0" y="0"/>
-          <a:chExt cx="0" cy="0"/>
-        </a:xfrm>
-      </p:grpSpPr>
-      <p:sp>
-        <p:nvSpPr>
-          <p:cNvPr id="2" name="Slide Image Placeholder 1"/>
-          <p:cNvSpPr>
-            <a:spLocks noGrp="1" noRot="1" noChangeAspect="1"/>
-          </p:cNvSpPr>
-          <p:nvPr>
-            <p:ph type="sldImg"/>
-          </p:nvPr>
-        </p:nvSpPr>
-        <p:spPr>
-          <a:xfrm>
-            <a:off x="-457200" y="3048000"/>
-            <a:ext cx="14630400" cy="8229600"/>
-          </a:xfrm>
-          <a:prstGeom prst="rect">
-            <a:avLst/>
-          </a:prstGeom>
-          <a:noFill/>
-          <a:ln w="12700">
-            <a:solidFill>
-              <a:prstClr val="black"/>
-            </a:solidFill>
-          </a:ln>
-        </p:spPr>
-      </p:sp>
-      <p:sp>
-        <p:nvSpPr>
-          <p:cNvPr id="3" name="Notes Placeholder 2"/>
-          <p:cNvSpPr>
-            <a:spLocks noGrp="1"/>
-          </p:cNvSpPr>
-          <p:nvPr>
-            <p:ph type="body" idx="1"/>
-          </p:nvPr>
-        </p:nvSpPr>
-        <p:spPr>
-          <a:xfrm>
-            <a:off x="1371600" y="11734800"/>
-            <a:ext cx="10972800" cy="9601200"/>
-          </a:xfrm>
-          <a:prstGeom prst="rect">
-            <a:avLst/>
-          </a:prstGeom>
-        </p:spPr>
-        <p:txBody>
-          <a:bodyPr/>
-          <a:lstStyle/>
-          <a:p>
-            <a:endParaRPr lang="en-US" dirty="0"/>
-          </a:p>
-        </p:txBody>
-      </p:sp>
-    </p:spTree>
-    <p:extLst>
-      <p:ext uri="{BB962C8B-B14F-4D97-AF65-F5344CB8AC3E}">
-        <p14:creationId xmlns:p14="http://schemas.microsoft.com/office/powerpoint/2010/main" val="87667087"/>
-      </p:ext>
-    </p:extLst>
-  </p:cSld>
-  <p:clrMapOvr>
-    <a:masterClrMapping/>
-  </p:clrMapOvr>
-</p:notes>
-</file>
-
-<file path=ppt/notesSlides/notesSlide9.xml><?xml version="1.0" encoding="utf-8"?>
-<p:notes xmlns:a="http://schemas.openxmlformats.org/drawingml/2006/main" xmlns:r="http://schemas.openxmlformats.org/officeDocument/2006/relationships" xmlns:p="http://schemas.openxmlformats.org/presentationml/2006/main">
-  <p:cSld>
-    <p:spTree>
-      <p:nvGrpSpPr>
         <p:cNvPr id="1" name="">
           <a:extLst>
             <a:ext uri="{FF2B5EF4-FFF2-40B4-BE49-F238E27FC236}">
-              <a16:creationId xmlns:a16="http://schemas.microsoft.com/office/drawing/2014/main" id="{FAD0BEF7-6357-38EA-5E62-D0FD2CB6EF1B}"/>
+              <a16:creationId xmlns:a16="http://schemas.microsoft.com/office/drawing/2014/main" id="{CBA88A1C-156E-AB5D-E9B3-A0F5B6BAE0B3}"/>
             </a:ext>
           </a:extLst>
         </p:cNvPr>
@@ -1757,7 +1860,7 @@
           <p:cNvPr id="2" name="Slide Image Placeholder 1">
             <a:extLst>
               <a:ext uri="{FF2B5EF4-FFF2-40B4-BE49-F238E27FC236}">
-                <a16:creationId xmlns:a16="http://schemas.microsoft.com/office/drawing/2014/main" id="{CE7E49EF-EDF8-DA7F-6842-F09BC2B03DC5}"/>
+                <a16:creationId xmlns:a16="http://schemas.microsoft.com/office/drawing/2014/main" id="{E77A1CCF-4B91-6165-5F0A-2168B98AD4A1}"/>
               </a:ext>
             </a:extLst>
           </p:cNvPr>
@@ -1789,7 +1892,7 @@
           <p:cNvPr id="3" name="Notes Placeholder 2">
             <a:extLst>
               <a:ext uri="{FF2B5EF4-FFF2-40B4-BE49-F238E27FC236}">
-                <a16:creationId xmlns:a16="http://schemas.microsoft.com/office/drawing/2014/main" id="{BC6D11B8-14E6-6B9D-B736-10AEE0373B2C}"/>
+                <a16:creationId xmlns:a16="http://schemas.microsoft.com/office/drawing/2014/main" id="{D34EB2E1-0E2C-A0CD-F1FB-3FD450A856A4}"/>
               </a:ext>
             </a:extLst>
           </p:cNvPr>
@@ -1820,7 +1923,108 @@
     </p:spTree>
     <p:extLst>
       <p:ext uri="{BB962C8B-B14F-4D97-AF65-F5344CB8AC3E}">
-        <p14:creationId xmlns:p14="http://schemas.microsoft.com/office/powerpoint/2010/main" val="2407500314"/>
+        <p14:creationId xmlns:p14="http://schemas.microsoft.com/office/powerpoint/2010/main" val="4174187399"/>
+      </p:ext>
+    </p:extLst>
+  </p:cSld>
+  <p:clrMapOvr>
+    <a:masterClrMapping/>
+  </p:clrMapOvr>
+</p:notes>
+</file>
+
+<file path=ppt/notesSlides/notesSlide9.xml><?xml version="1.0" encoding="utf-8"?>
+<p:notes xmlns:a="http://schemas.openxmlformats.org/drawingml/2006/main" xmlns:r="http://schemas.openxmlformats.org/officeDocument/2006/relationships" xmlns:p="http://schemas.openxmlformats.org/presentationml/2006/main">
+  <p:cSld>
+    <p:spTree>
+      <p:nvGrpSpPr>
+        <p:cNvPr id="1" name="">
+          <a:extLst>
+            <a:ext uri="{FF2B5EF4-FFF2-40B4-BE49-F238E27FC236}">
+              <a16:creationId xmlns:a16="http://schemas.microsoft.com/office/drawing/2014/main" id="{06FE25B2-7F19-34A1-C96B-26FA95C6B199}"/>
+            </a:ext>
+          </a:extLst>
+        </p:cNvPr>
+        <p:cNvGrpSpPr/>
+        <p:nvPr/>
+      </p:nvGrpSpPr>
+      <p:grpSpPr>
+        <a:xfrm>
+          <a:off x="0" y="0"/>
+          <a:ext cx="0" cy="0"/>
+          <a:chOff x="0" y="0"/>
+          <a:chExt cx="0" cy="0"/>
+        </a:xfrm>
+      </p:grpSpPr>
+      <p:sp>
+        <p:nvSpPr>
+          <p:cNvPr id="2" name="Slide Image Placeholder 1">
+            <a:extLst>
+              <a:ext uri="{FF2B5EF4-FFF2-40B4-BE49-F238E27FC236}">
+                <a16:creationId xmlns:a16="http://schemas.microsoft.com/office/drawing/2014/main" id="{363E8811-B61B-B495-CA7B-BF21532D0655}"/>
+              </a:ext>
+            </a:extLst>
+          </p:cNvPr>
+          <p:cNvSpPr>
+            <a:spLocks noGrp="1" noRot="1" noChangeAspect="1"/>
+          </p:cNvSpPr>
+          <p:nvPr>
+            <p:ph type="sldImg"/>
+          </p:nvPr>
+        </p:nvSpPr>
+        <p:spPr>
+          <a:xfrm>
+            <a:off x="-457200" y="3048000"/>
+            <a:ext cx="14630400" cy="8229600"/>
+          </a:xfrm>
+          <a:prstGeom prst="rect">
+            <a:avLst/>
+          </a:prstGeom>
+          <a:noFill/>
+          <a:ln w="12700">
+            <a:solidFill>
+              <a:prstClr val="black"/>
+            </a:solidFill>
+          </a:ln>
+        </p:spPr>
+      </p:sp>
+      <p:sp>
+        <p:nvSpPr>
+          <p:cNvPr id="3" name="Notes Placeholder 2">
+            <a:extLst>
+              <a:ext uri="{FF2B5EF4-FFF2-40B4-BE49-F238E27FC236}">
+                <a16:creationId xmlns:a16="http://schemas.microsoft.com/office/drawing/2014/main" id="{FC6B35F3-75C8-A5E5-9D17-D7D67224A552}"/>
+              </a:ext>
+            </a:extLst>
+          </p:cNvPr>
+          <p:cNvSpPr>
+            <a:spLocks noGrp="1"/>
+          </p:cNvSpPr>
+          <p:nvPr>
+            <p:ph type="body" idx="1"/>
+          </p:nvPr>
+        </p:nvSpPr>
+        <p:spPr>
+          <a:xfrm>
+            <a:off x="1371600" y="11734800"/>
+            <a:ext cx="10972800" cy="9601200"/>
+          </a:xfrm>
+          <a:prstGeom prst="rect">
+            <a:avLst/>
+          </a:prstGeom>
+        </p:spPr>
+        <p:txBody>
+          <a:bodyPr/>
+          <a:lstStyle/>
+          <a:p>
+            <a:endParaRPr lang="en-US" dirty="0"/>
+          </a:p>
+        </p:txBody>
+      </p:sp>
+    </p:spTree>
+    <p:extLst>
+      <p:ext uri="{BB962C8B-B14F-4D97-AF65-F5344CB8AC3E}">
+        <p14:creationId xmlns:p14="http://schemas.microsoft.com/office/powerpoint/2010/main" val="973466384"/>
       </p:ext>
     </p:extLst>
   </p:cSld>
@@ -18071,6 +18275,485 @@
 </file>
 
 <file path=ppt/slides/slide10.xml><?xml version="1.0" encoding="utf-8"?>
+<p:sld xmlns:a="http://schemas.openxmlformats.org/drawingml/2006/main" xmlns:r="http://schemas.openxmlformats.org/officeDocument/2006/relationships" xmlns:p="http://schemas.openxmlformats.org/presentationml/2006/main" showMasterSp="0">
+  <p:cSld>
+    <p:spTree>
+      <p:nvGrpSpPr>
+        <p:cNvPr id="1" name="">
+          <a:extLst>
+            <a:ext uri="{FF2B5EF4-FFF2-40B4-BE49-F238E27FC236}">
+              <a16:creationId xmlns:a16="http://schemas.microsoft.com/office/drawing/2014/main" id="{919B111B-9236-BD68-6004-04EBA9540C85}"/>
+            </a:ext>
+          </a:extLst>
+        </p:cNvPr>
+        <p:cNvGrpSpPr/>
+        <p:nvPr/>
+      </p:nvGrpSpPr>
+      <p:grpSpPr>
+        <a:xfrm>
+          <a:off x="0" y="0"/>
+          <a:ext cx="0" cy="0"/>
+          <a:chOff x="0" y="0"/>
+          <a:chExt cx="0" cy="0"/>
+        </a:xfrm>
+      </p:grpSpPr>
+      <p:sp>
+        <p:nvSpPr>
+          <p:cNvPr id="2" name="Title 1">
+            <a:extLst>
+              <a:ext uri="{FF2B5EF4-FFF2-40B4-BE49-F238E27FC236}">
+                <a16:creationId xmlns:a16="http://schemas.microsoft.com/office/drawing/2014/main" id="{97698FBE-F3D6-4111-F905-4195574FDE3E}"/>
+              </a:ext>
+            </a:extLst>
+          </p:cNvPr>
+          <p:cNvSpPr>
+            <a:spLocks noGrp="1"/>
+          </p:cNvSpPr>
+          <p:nvPr>
+            <p:ph type="title"/>
+          </p:nvPr>
+        </p:nvSpPr>
+        <p:spPr>
+          <a:xfrm>
+            <a:off x="914399" y="834635"/>
+            <a:ext cx="7796464" cy="1222385"/>
+          </a:xfrm>
+        </p:spPr>
+        <p:txBody>
+          <a:bodyPr/>
+          <a:lstStyle/>
+          <a:p>
+            <a:r>
+              <a:rPr lang="en-US" dirty="0"/>
+              <a:t>Unsupervised Model to Detect Anomalies</a:t>
+            </a:r>
+          </a:p>
+        </p:txBody>
+      </p:sp>
+      <p:sp>
+        <p:nvSpPr>
+          <p:cNvPr id="3" name="Slide Number Placeholder 2">
+            <a:extLst>
+              <a:ext uri="{FF2B5EF4-FFF2-40B4-BE49-F238E27FC236}">
+                <a16:creationId xmlns:a16="http://schemas.microsoft.com/office/drawing/2014/main" id="{8624DCA0-8503-AC44-A893-58995C2A5E35}"/>
+              </a:ext>
+            </a:extLst>
+          </p:cNvPr>
+          <p:cNvSpPr>
+            <a:spLocks noGrp="1"/>
+          </p:cNvSpPr>
+          <p:nvPr>
+            <p:ph type="sldNum" sz="quarter" idx="10"/>
+          </p:nvPr>
+        </p:nvSpPr>
+        <p:spPr>
+          <a:xfrm>
+            <a:off x="10438475" y="457199"/>
+            <a:ext cx="987552" cy="471489"/>
+          </a:xfrm>
+        </p:spPr>
+        <p:txBody>
+          <a:bodyPr/>
+          <a:lstStyle/>
+          <a:p>
+            <a:fld id="{48F63A3B-78C7-47BE-AE5E-E10140E04643}" type="slidenum">
+              <a:rPr lang="en-US" smtClean="0"/>
+              <a:pPr/>
+              <a:t>10</a:t>
+            </a:fld>
+            <a:endParaRPr lang="en-US" dirty="0"/>
+          </a:p>
+        </p:txBody>
+      </p:sp>
+      <p:sp>
+        <p:nvSpPr>
+          <p:cNvPr id="17" name="Content Placeholder 6">
+            <a:extLst>
+              <a:ext uri="{FF2B5EF4-FFF2-40B4-BE49-F238E27FC236}">
+                <a16:creationId xmlns:a16="http://schemas.microsoft.com/office/drawing/2014/main" id="{243D5808-6D28-A5F1-CD92-4E0697FCC387}"/>
+              </a:ext>
+            </a:extLst>
+          </p:cNvPr>
+          <p:cNvSpPr>
+            <a:spLocks noGrp="1"/>
+          </p:cNvSpPr>
+          <p:nvPr>
+            <p:ph sz="quarter" idx="4"/>
+          </p:nvPr>
+        </p:nvSpPr>
+        <p:spPr>
+          <a:xfrm>
+            <a:off x="7792210" y="2135246"/>
+            <a:ext cx="3633817" cy="4335516"/>
+          </a:xfrm>
+        </p:spPr>
+        <p:txBody>
+          <a:bodyPr>
+            <a:noAutofit/>
+          </a:bodyPr>
+          <a:lstStyle/>
+          <a:p>
+            <a:r>
+              <a:rPr lang="en-US" sz="1600" b="1" dirty="0"/>
+              <a:t>Analysis:</a:t>
+            </a:r>
+          </a:p>
+          <a:p>
+            <a:r>
+              <a:rPr lang="en-US" sz="1600" dirty="0">
+                <a:solidFill>
+                  <a:schemeClr val="tx1">
+                    <a:lumMod val="75000"/>
+                    <a:lumOff val="25000"/>
+                  </a:schemeClr>
+                </a:solidFill>
+              </a:rPr>
+              <a:t>The Isolation Forest model </a:t>
+            </a:r>
+            <a:r>
+              <a:rPr lang="en-US" sz="1600" dirty="0">
+                <a:solidFill>
+                  <a:srgbClr val="202C8F"/>
+                </a:solidFill>
+              </a:rPr>
+              <a:t>identified 100 instances as anomalies within the payment data, assuming a 5% contamination rate</a:t>
+            </a:r>
+            <a:r>
+              <a:rPr lang="en-US" sz="1600" dirty="0">
+                <a:solidFill>
+                  <a:schemeClr val="tx1">
+                    <a:lumMod val="75000"/>
+                    <a:lumOff val="25000"/>
+                  </a:schemeClr>
+                </a:solidFill>
+              </a:rPr>
+              <a:t>. These anomalies represent data points that deviate significantly from the normal patterns observed in the dataset across various features such as 'Invoice value' and '</a:t>
+            </a:r>
+            <a:r>
+              <a:rPr lang="en-US" sz="1600" dirty="0" err="1">
+                <a:solidFill>
+                  <a:schemeClr val="tx1">
+                    <a:lumMod val="75000"/>
+                    <a:lumOff val="25000"/>
+                  </a:schemeClr>
+                </a:solidFill>
+              </a:rPr>
+              <a:t>time_to_payment</a:t>
+            </a:r>
+            <a:r>
+              <a:rPr lang="en-US" sz="1600" dirty="0">
+                <a:solidFill>
+                  <a:schemeClr val="tx1">
+                    <a:lumMod val="75000"/>
+                    <a:lumOff val="25000"/>
+                  </a:schemeClr>
+                </a:solidFill>
+              </a:rPr>
+              <a:t>'. These identified anomalies warrant further investigation as they could indicate unusual payment activities, potential errors, or even fraudulent transactions that are not easily captured by simple outlier rules.</a:t>
+            </a:r>
+          </a:p>
+        </p:txBody>
+      </p:sp>
+      <p:pic>
+        <p:nvPicPr>
+          <p:cNvPr id="8" name="Picture 7">
+            <a:extLst>
+              <a:ext uri="{FF2B5EF4-FFF2-40B4-BE49-F238E27FC236}">
+                <a16:creationId xmlns:a16="http://schemas.microsoft.com/office/drawing/2014/main" id="{D1A571A9-A7F5-C11A-16E7-A672299553F1}"/>
+              </a:ext>
+            </a:extLst>
+          </p:cNvPr>
+          <p:cNvPicPr>
+            <a:picLocks noChangeAspect="1"/>
+          </p:cNvPicPr>
+          <p:nvPr/>
+        </p:nvPicPr>
+        <p:blipFill>
+          <a:blip r:embed="rId3"/>
+          <a:stretch>
+            <a:fillRect/>
+          </a:stretch>
+        </p:blipFill>
+        <p:spPr>
+          <a:xfrm>
+            <a:off x="914399" y="2264462"/>
+            <a:ext cx="3787315" cy="1969475"/>
+          </a:xfrm>
+          <a:prstGeom prst="rect">
+            <a:avLst/>
+          </a:prstGeom>
+          <a:ln>
+            <a:solidFill>
+              <a:schemeClr val="bg2">
+                <a:lumMod val="90000"/>
+              </a:schemeClr>
+            </a:solidFill>
+          </a:ln>
+        </p:spPr>
+      </p:pic>
+      <p:pic>
+        <p:nvPicPr>
+          <p:cNvPr id="11" name="Picture 10">
+            <a:extLst>
+              <a:ext uri="{FF2B5EF4-FFF2-40B4-BE49-F238E27FC236}">
+                <a16:creationId xmlns:a16="http://schemas.microsoft.com/office/drawing/2014/main" id="{5AF17244-7B46-A25C-78FA-9EBFE66187FB}"/>
+              </a:ext>
+            </a:extLst>
+          </p:cNvPr>
+          <p:cNvPicPr>
+            <a:picLocks noChangeAspect="1"/>
+          </p:cNvPicPr>
+          <p:nvPr/>
+        </p:nvPicPr>
+        <p:blipFill>
+          <a:blip r:embed="rId4"/>
+          <a:stretch>
+            <a:fillRect/>
+          </a:stretch>
+        </p:blipFill>
+        <p:spPr>
+          <a:xfrm>
+            <a:off x="914399" y="4303004"/>
+            <a:ext cx="3787315" cy="2335540"/>
+          </a:xfrm>
+          <a:prstGeom prst="rect">
+            <a:avLst/>
+          </a:prstGeom>
+          <a:ln>
+            <a:solidFill>
+              <a:schemeClr val="bg2">
+                <a:lumMod val="90000"/>
+              </a:schemeClr>
+            </a:solidFill>
+          </a:ln>
+        </p:spPr>
+      </p:pic>
+      <p:pic>
+        <p:nvPicPr>
+          <p:cNvPr id="14" name="Picture 13">
+            <a:extLst>
+              <a:ext uri="{FF2B5EF4-FFF2-40B4-BE49-F238E27FC236}">
+                <a16:creationId xmlns:a16="http://schemas.microsoft.com/office/drawing/2014/main" id="{4419D3FB-3E36-B3AF-EAAA-BD7580B12B37}"/>
+              </a:ext>
+            </a:extLst>
+          </p:cNvPr>
+          <p:cNvPicPr>
+            <a:picLocks noChangeAspect="1"/>
+          </p:cNvPicPr>
+          <p:nvPr/>
+        </p:nvPicPr>
+        <p:blipFill>
+          <a:blip r:embed="rId5"/>
+          <a:stretch>
+            <a:fillRect/>
+          </a:stretch>
+        </p:blipFill>
+        <p:spPr>
+          <a:xfrm>
+            <a:off x="4929050" y="4303004"/>
+            <a:ext cx="2635824" cy="2335540"/>
+          </a:xfrm>
+          <a:prstGeom prst="rect">
+            <a:avLst/>
+          </a:prstGeom>
+          <a:ln>
+            <a:solidFill>
+              <a:schemeClr val="bg2">
+                <a:lumMod val="90000"/>
+              </a:schemeClr>
+            </a:solidFill>
+          </a:ln>
+        </p:spPr>
+      </p:pic>
+      <p:pic>
+        <p:nvPicPr>
+          <p:cNvPr id="18" name="Picture 17">
+            <a:extLst>
+              <a:ext uri="{FF2B5EF4-FFF2-40B4-BE49-F238E27FC236}">
+                <a16:creationId xmlns:a16="http://schemas.microsoft.com/office/drawing/2014/main" id="{A41AAEEE-3B88-7FDB-9605-A23C67EB7AFA}"/>
+              </a:ext>
+            </a:extLst>
+          </p:cNvPr>
+          <p:cNvPicPr>
+            <a:picLocks noChangeAspect="1"/>
+          </p:cNvPicPr>
+          <p:nvPr/>
+        </p:nvPicPr>
+        <p:blipFill>
+          <a:blip r:embed="rId6"/>
+          <a:stretch>
+            <a:fillRect/>
+          </a:stretch>
+        </p:blipFill>
+        <p:spPr>
+          <a:xfrm>
+            <a:off x="4929050" y="2264462"/>
+            <a:ext cx="2635824" cy="1968526"/>
+          </a:xfrm>
+          <a:prstGeom prst="rect">
+            <a:avLst/>
+          </a:prstGeom>
+          <a:ln>
+            <a:solidFill>
+              <a:schemeClr val="bg2">
+                <a:lumMod val="90000"/>
+              </a:schemeClr>
+            </a:solidFill>
+          </a:ln>
+        </p:spPr>
+      </p:pic>
+    </p:spTree>
+    <p:extLst>
+      <p:ext uri="{BB962C8B-B14F-4D97-AF65-F5344CB8AC3E}">
+        <p14:creationId xmlns:p14="http://schemas.microsoft.com/office/powerpoint/2010/main" val="1893098157"/>
+      </p:ext>
+    </p:extLst>
+  </p:cSld>
+  <p:clrMapOvr>
+    <a:masterClrMapping/>
+  </p:clrMapOvr>
+</p:sld>
+</file>
+
+<file path=ppt/slides/slide11.xml><?xml version="1.0" encoding="utf-8"?>
+<p:sld xmlns:a="http://schemas.openxmlformats.org/drawingml/2006/main" xmlns:r="http://schemas.openxmlformats.org/officeDocument/2006/relationships" xmlns:p="http://schemas.openxmlformats.org/presentationml/2006/main">
+  <p:cSld>
+    <p:spTree>
+      <p:nvGrpSpPr>
+        <p:cNvPr id="1" name=""/>
+        <p:cNvGrpSpPr/>
+        <p:nvPr/>
+      </p:nvGrpSpPr>
+      <p:grpSpPr>
+        <a:xfrm>
+          <a:off x="0" y="0"/>
+          <a:ext cx="0" cy="0"/>
+          <a:chOff x="0" y="0"/>
+          <a:chExt cx="0" cy="0"/>
+        </a:xfrm>
+      </p:grpSpPr>
+      <p:sp>
+        <p:nvSpPr>
+          <p:cNvPr id="2" name="Title 1">
+            <a:extLst>
+              <a:ext uri="{FF2B5EF4-FFF2-40B4-BE49-F238E27FC236}">
+                <a16:creationId xmlns:a16="http://schemas.microsoft.com/office/drawing/2014/main" id="{B6210199-C129-11F0-56F2-2D1AED21CB4C}"/>
+              </a:ext>
+            </a:extLst>
+          </p:cNvPr>
+          <p:cNvSpPr>
+            <a:spLocks noGrp="1"/>
+          </p:cNvSpPr>
+          <p:nvPr>
+            <p:ph type="title"/>
+          </p:nvPr>
+        </p:nvSpPr>
+        <p:spPr>
+          <a:xfrm>
+            <a:off x="4364809" y="1057274"/>
+            <a:ext cx="7043617" cy="2520217"/>
+          </a:xfrm>
+        </p:spPr>
+        <p:txBody>
+          <a:bodyPr/>
+          <a:lstStyle/>
+          <a:p>
+            <a:r>
+              <a:rPr lang="en-US" dirty="0"/>
+              <a:t>Selecting </a:t>
+            </a:r>
+            <a:br>
+              <a:rPr lang="en-US" dirty="0"/>
+            </a:br>
+            <a:r>
+              <a:rPr lang="en-US" dirty="0"/>
+              <a:t>visual aids</a:t>
+            </a:r>
+          </a:p>
+        </p:txBody>
+      </p:sp>
+      <p:sp>
+        <p:nvSpPr>
+          <p:cNvPr id="3" name="Slide Number Placeholder 2">
+            <a:extLst>
+              <a:ext uri="{FF2B5EF4-FFF2-40B4-BE49-F238E27FC236}">
+                <a16:creationId xmlns:a16="http://schemas.microsoft.com/office/drawing/2014/main" id="{370AEC4F-E711-8552-9C34-82C1514A1E37}"/>
+              </a:ext>
+            </a:extLst>
+          </p:cNvPr>
+          <p:cNvSpPr>
+            <a:spLocks noGrp="1"/>
+          </p:cNvSpPr>
+          <p:nvPr>
+            <p:ph type="sldNum" sz="quarter" idx="10"/>
+          </p:nvPr>
+        </p:nvSpPr>
+        <p:spPr>
+          <a:xfrm>
+            <a:off x="10438475" y="457199"/>
+            <a:ext cx="987552" cy="471489"/>
+          </a:xfrm>
+        </p:spPr>
+        <p:txBody>
+          <a:bodyPr/>
+          <a:lstStyle/>
+          <a:p>
+            <a:fld id="{48F63A3B-78C7-47BE-AE5E-E10140E04643}" type="slidenum">
+              <a:rPr lang="en-US" smtClean="0"/>
+              <a:pPr/>
+              <a:t>11</a:t>
+            </a:fld>
+            <a:endParaRPr lang="en-US" dirty="0"/>
+          </a:p>
+        </p:txBody>
+      </p:sp>
+      <p:sp>
+        <p:nvSpPr>
+          <p:cNvPr id="4" name="Content Placeholder 3">
+            <a:extLst>
+              <a:ext uri="{FF2B5EF4-FFF2-40B4-BE49-F238E27FC236}">
+                <a16:creationId xmlns:a16="http://schemas.microsoft.com/office/drawing/2014/main" id="{BDDD6BDC-E008-6AB7-55A1-46ED9BCF054F}"/>
+              </a:ext>
+            </a:extLst>
+          </p:cNvPr>
+          <p:cNvSpPr>
+            <a:spLocks noGrp="1"/>
+          </p:cNvSpPr>
+          <p:nvPr>
+            <p:ph idx="11"/>
+          </p:nvPr>
+        </p:nvSpPr>
+        <p:spPr>
+          <a:xfrm>
+            <a:off x="4364808" y="3808750"/>
+            <a:ext cx="7043618" cy="2233233"/>
+          </a:xfrm>
+        </p:spPr>
+        <p:txBody>
+          <a:bodyPr/>
+          <a:lstStyle/>
+          <a:p>
+            <a:r>
+              <a:rPr lang="en-US" dirty="0"/>
+              <a:t>Enhancing your presentation</a:t>
+            </a:r>
+          </a:p>
+        </p:txBody>
+      </p:sp>
+    </p:spTree>
+    <p:extLst>
+      <p:ext uri="{BB962C8B-B14F-4D97-AF65-F5344CB8AC3E}">
+        <p14:creationId xmlns:p14="http://schemas.microsoft.com/office/powerpoint/2010/main" val="1131718056"/>
+      </p:ext>
+    </p:extLst>
+  </p:cSld>
+  <p:clrMapOvr>
+    <a:masterClrMapping/>
+  </p:clrMapOvr>
+</p:sld>
+</file>
+
+<file path=ppt/slides/slide12.xml><?xml version="1.0" encoding="utf-8"?>
 <p:sld xmlns:a="http://schemas.openxmlformats.org/drawingml/2006/main" xmlns:r="http://schemas.openxmlformats.org/officeDocument/2006/relationships" xmlns:p="http://schemas.openxmlformats.org/presentationml/2006/main">
   <p:cSld>
     <p:spTree>
@@ -18155,7 +18838,7 @@
             <a:fld id="{48F63A3B-78C7-47BE-AE5E-E10140E04643}" type="slidenum">
               <a:rPr lang="en-US" smtClean="0"/>
               <a:pPr/>
-              <a:t>10</a:t>
+              <a:t>12</a:t>
             </a:fld>
             <a:endParaRPr lang="en-US" dirty="0"/>
           </a:p>
@@ -18293,7 +18976,7 @@
 </p:sld>
 </file>
 
-<file path=ppt/slides/slide11.xml><?xml version="1.0" encoding="utf-8"?>
+<file path=ppt/slides/slide13.xml><?xml version="1.0" encoding="utf-8"?>
 <p:sld xmlns:a="http://schemas.openxmlformats.org/drawingml/2006/main" xmlns:r="http://schemas.openxmlformats.org/officeDocument/2006/relationships" xmlns:p="http://schemas.openxmlformats.org/presentationml/2006/main">
   <p:cSld>
     <p:spTree>
@@ -18519,7 +19202,7 @@
             <a:fld id="{48F63A3B-78C7-47BE-AE5E-E10140E04643}" type="slidenum">
               <a:rPr lang="en-US" smtClean="0"/>
               <a:pPr/>
-              <a:t>11</a:t>
+              <a:t>13</a:t>
             </a:fld>
             <a:endParaRPr lang="en-US" dirty="0"/>
           </a:p>
@@ -18538,7 +19221,7 @@
 </p:sld>
 </file>
 
-<file path=ppt/slides/slide12.xml><?xml version="1.0" encoding="utf-8"?>
+<file path=ppt/slides/slide14.xml><?xml version="1.0" encoding="utf-8"?>
 <p:sld xmlns:a="http://schemas.openxmlformats.org/drawingml/2006/main" xmlns:r="http://schemas.openxmlformats.org/officeDocument/2006/relationships" xmlns:p="http://schemas.openxmlformats.org/presentationml/2006/main">
   <p:cSld>
     <p:spTree>
@@ -18695,7 +19378,7 @@
             <a:fld id="{48F63A3B-78C7-47BE-AE5E-E10140E04643}" type="slidenum">
               <a:rPr lang="en-US" smtClean="0"/>
               <a:pPr/>
-              <a:t>12</a:t>
+              <a:t>14</a:t>
             </a:fld>
             <a:endParaRPr lang="en-US" dirty="0"/>
           </a:p>
@@ -18714,7 +19397,7 @@
 </p:sld>
 </file>
 
-<file path=ppt/slides/slide13.xml><?xml version="1.0" encoding="utf-8"?>
+<file path=ppt/slides/slide15.xml><?xml version="1.0" encoding="utf-8"?>
 <p:sld xmlns:a="http://schemas.openxmlformats.org/drawingml/2006/main" xmlns:r="http://schemas.openxmlformats.org/officeDocument/2006/relationships" xmlns:p="http://schemas.openxmlformats.org/presentationml/2006/main">
   <p:cSld>
     <p:spTree>
@@ -18826,7 +19509,7 @@
         </p:nvGraphicFramePr>
         <p:xfrm>
           <a:off x="5087938" y="2332038"/>
-          <a:ext cx="6345236" cy="3913230"/>
+          <a:ext cx="6345236" cy="3879279"/>
         </p:xfrm>
         <a:graphic>
           <a:graphicData uri="http://schemas.openxmlformats.org/drawingml/2006/table">
@@ -19347,7 +20030,7 @@
             <a:fld id="{48F63A3B-78C7-47BE-AE5E-E10140E04643}" type="slidenum">
               <a:rPr lang="en-US" smtClean="0"/>
               <a:pPr/>
-              <a:t>13</a:t>
+              <a:t>15</a:t>
             </a:fld>
             <a:endParaRPr lang="en-US" dirty="0"/>
           </a:p>
@@ -19366,7 +20049,7 @@
 </p:sld>
 </file>
 
-<file path=ppt/slides/slide14.xml><?xml version="1.0" encoding="utf-8"?>
+<file path=ppt/slides/slide16.xml><?xml version="1.0" encoding="utf-8"?>
 <p:sld xmlns:a="http://schemas.openxmlformats.org/drawingml/2006/main" xmlns:r="http://schemas.openxmlformats.org/officeDocument/2006/relationships" xmlns:p="http://schemas.openxmlformats.org/presentationml/2006/main">
   <p:cSld>
     <p:spTree>
@@ -19583,7 +20266,7 @@
             <a:fld id="{48F63A3B-78C7-47BE-AE5E-E10140E04643}" type="slidenum">
               <a:rPr lang="en-US" smtClean="0"/>
               <a:pPr/>
-              <a:t>14</a:t>
+              <a:t>16</a:t>
             </a:fld>
             <a:endParaRPr lang="en-US" dirty="0"/>
           </a:p>
@@ -19602,7 +20285,7 @@
 </p:sld>
 </file>
 
-<file path=ppt/slides/slide15.xml><?xml version="1.0" encoding="utf-8"?>
+<file path=ppt/slides/slide17.xml><?xml version="1.0" encoding="utf-8"?>
 <p:sld xmlns:a="http://schemas.openxmlformats.org/drawingml/2006/main" xmlns:r="http://schemas.openxmlformats.org/officeDocument/2006/relationships" xmlns:p="http://schemas.openxmlformats.org/presentationml/2006/main">
   <p:cSld>
     <p:spTree>
@@ -20100,7 +20783,7 @@
             <a:fld id="{48F63A3B-78C7-47BE-AE5E-E10140E04643}" type="slidenum">
               <a:rPr lang="en-US" smtClean="0"/>
               <a:pPr/>
-              <a:t>15</a:t>
+              <a:t>17</a:t>
             </a:fld>
             <a:endParaRPr lang="en-US" dirty="0"/>
           </a:p>
@@ -20119,7 +20802,7 @@
 </p:sld>
 </file>
 
-<file path=ppt/slides/slide16.xml><?xml version="1.0" encoding="utf-8"?>
+<file path=ppt/slides/slide18.xml><?xml version="1.0" encoding="utf-8"?>
 <p:sld xmlns:a="http://schemas.openxmlformats.org/drawingml/2006/main" xmlns:r="http://schemas.openxmlformats.org/officeDocument/2006/relationships" xmlns:p="http://schemas.openxmlformats.org/presentationml/2006/main">
   <p:cSld>
     <p:spTree>
@@ -20950,7 +21633,7 @@
 </file>
 
 <file path=ppt/slides/slide7.xml><?xml version="1.0" encoding="utf-8"?>
-<p:sld xmlns:a="http://schemas.openxmlformats.org/drawingml/2006/main" xmlns:r="http://schemas.openxmlformats.org/officeDocument/2006/relationships" xmlns:p="http://schemas.openxmlformats.org/presentationml/2006/main">
+<p:sld xmlns:a="http://schemas.openxmlformats.org/drawingml/2006/main" xmlns:r="http://schemas.openxmlformats.org/officeDocument/2006/relationships" xmlns:p="http://schemas.openxmlformats.org/presentationml/2006/main" showMasterSp="0">
   <p:cSld>
     <p:spTree>
       <p:nvGrpSpPr>
@@ -21253,12 +21936,19 @@
         </p:blipFill>
         <p:spPr>
           <a:xfrm>
-            <a:off x="9228473" y="849201"/>
+            <a:off x="9061321" y="1066077"/>
             <a:ext cx="2754308" cy="2473902"/>
           </a:xfrm>
           <a:prstGeom prst="rect">
             <a:avLst/>
           </a:prstGeom>
+          <a:ln>
+            <a:solidFill>
+              <a:schemeClr val="bg2">
+                <a:lumMod val="90000"/>
+              </a:schemeClr>
+            </a:solidFill>
+          </a:ln>
         </p:spPr>
       </p:pic>
       <p:pic>
@@ -21283,12 +21973,19 @@
         </p:blipFill>
         <p:spPr>
           <a:xfrm>
-            <a:off x="9228474" y="3596233"/>
+            <a:off x="9061321" y="3715105"/>
             <a:ext cx="2754308" cy="2473902"/>
           </a:xfrm>
           <a:prstGeom prst="rect">
             <a:avLst/>
           </a:prstGeom>
+          <a:ln>
+            <a:solidFill>
+              <a:schemeClr val="bg2">
+                <a:lumMod val="90000"/>
+              </a:schemeClr>
+            </a:solidFill>
+          </a:ln>
         </p:spPr>
       </p:pic>
     </p:spTree>
@@ -21305,7 +22002,7 @@
 </file>
 
 <file path=ppt/slides/slide8.xml><?xml version="1.0" encoding="utf-8"?>
-<p:sld xmlns:a="http://schemas.openxmlformats.org/drawingml/2006/main" xmlns:r="http://schemas.openxmlformats.org/officeDocument/2006/relationships" xmlns:p="http://schemas.openxmlformats.org/presentationml/2006/main">
+<p:sld xmlns:a="http://schemas.openxmlformats.org/drawingml/2006/main" xmlns:r="http://schemas.openxmlformats.org/officeDocument/2006/relationships" xmlns:p="http://schemas.openxmlformats.org/presentationml/2006/main" showMasterSp="0">
   <p:cSld>
     <p:spTree>
       <p:nvGrpSpPr>
@@ -21827,6 +22524,13 @@
           <a:prstGeom prst="rect">
             <a:avLst/>
           </a:prstGeom>
+          <a:ln>
+            <a:solidFill>
+              <a:schemeClr val="bg2">
+                <a:lumMod val="90000"/>
+              </a:schemeClr>
+            </a:solidFill>
+          </a:ln>
         </p:spPr>
       </p:pic>
       <p:pic>
@@ -21851,12 +22555,19 @@
         </p:blipFill>
         <p:spPr>
           <a:xfrm>
-            <a:off x="9193204" y="1099659"/>
+            <a:off x="9193204" y="2001801"/>
             <a:ext cx="2812868" cy="1818722"/>
           </a:xfrm>
           <a:prstGeom prst="rect">
             <a:avLst/>
           </a:prstGeom>
+          <a:ln>
+            <a:solidFill>
+              <a:schemeClr val="bg2">
+                <a:lumMod val="90000"/>
+              </a:schemeClr>
+            </a:solidFill>
+          </a:ln>
         </p:spPr>
       </p:pic>
       <p:pic>
@@ -21887,6 +22598,13 @@
           <a:prstGeom prst="rect">
             <a:avLst/>
           </a:prstGeom>
+          <a:ln>
+            <a:solidFill>
+              <a:schemeClr val="bg2">
+                <a:lumMod val="90000"/>
+              </a:schemeClr>
+            </a:solidFill>
+          </a:ln>
         </p:spPr>
       </p:pic>
     </p:spTree>
@@ -21903,11 +22621,17 @@
 </file>
 
 <file path=ppt/slides/slide9.xml><?xml version="1.0" encoding="utf-8"?>
-<p:sld xmlns:a="http://schemas.openxmlformats.org/drawingml/2006/main" xmlns:r="http://schemas.openxmlformats.org/officeDocument/2006/relationships" xmlns:p="http://schemas.openxmlformats.org/presentationml/2006/main">
+<p:sld xmlns:a="http://schemas.openxmlformats.org/drawingml/2006/main" xmlns:r="http://schemas.openxmlformats.org/officeDocument/2006/relationships" xmlns:p="http://schemas.openxmlformats.org/presentationml/2006/main" showMasterSp="0">
   <p:cSld>
     <p:spTree>
       <p:nvGrpSpPr>
-        <p:cNvPr id="1" name=""/>
+        <p:cNvPr id="1" name="">
+          <a:extLst>
+            <a:ext uri="{FF2B5EF4-FFF2-40B4-BE49-F238E27FC236}">
+              <a16:creationId xmlns:a16="http://schemas.microsoft.com/office/drawing/2014/main" id="{21C5D45D-2420-5F96-3876-1A5EAA25BA3A}"/>
+            </a:ext>
+          </a:extLst>
+        </p:cNvPr>
         <p:cNvGrpSpPr/>
         <p:nvPr/>
       </p:nvGrpSpPr>
@@ -21924,7 +22648,7 @@
           <p:cNvPr id="2" name="Title 1">
             <a:extLst>
               <a:ext uri="{FF2B5EF4-FFF2-40B4-BE49-F238E27FC236}">
-                <a16:creationId xmlns:a16="http://schemas.microsoft.com/office/drawing/2014/main" id="{B6210199-C129-11F0-56F2-2D1AED21CB4C}"/>
+                <a16:creationId xmlns:a16="http://schemas.microsoft.com/office/drawing/2014/main" id="{8F0E179F-09C7-5445-9DD8-F66BA33746A6}"/>
               </a:ext>
             </a:extLst>
           </p:cNvPr>
@@ -21937,8 +22661,8 @@
         </p:nvSpPr>
         <p:spPr>
           <a:xfrm>
-            <a:off x="4364809" y="1057274"/>
-            <a:ext cx="7043617" cy="2520217"/>
+            <a:off x="914399" y="834635"/>
+            <a:ext cx="7796464" cy="1222385"/>
           </a:xfrm>
         </p:spPr>
         <p:txBody>
@@ -21947,14 +22671,7 @@
           <a:p>
             <a:r>
               <a:rPr lang="en-US" dirty="0"/>
-              <a:t>Selecting </a:t>
-            </a:r>
-            <a:br>
-              <a:rPr lang="en-US" dirty="0"/>
-            </a:br>
-            <a:r>
-              <a:rPr lang="en-US" dirty="0"/>
-              <a:t>visual aids</a:t>
+              <a:t>Supervised Model for Fraud Detection</a:t>
             </a:r>
           </a:p>
         </p:txBody>
@@ -21964,7 +22681,7 @@
           <p:cNvPr id="3" name="Slide Number Placeholder 2">
             <a:extLst>
               <a:ext uri="{FF2B5EF4-FFF2-40B4-BE49-F238E27FC236}">
-                <a16:creationId xmlns:a16="http://schemas.microsoft.com/office/drawing/2014/main" id="{370AEC4F-E711-8552-9C34-82C1514A1E37}"/>
+                <a16:creationId xmlns:a16="http://schemas.microsoft.com/office/drawing/2014/main" id="{B38378B5-5D07-8B28-1C7C-6F32AA0D65F5}"/>
               </a:ext>
             </a:extLst>
           </p:cNvPr>
@@ -21996,10 +22713,10 @@
       </p:sp>
       <p:sp>
         <p:nvSpPr>
-          <p:cNvPr id="4" name="Content Placeholder 3">
+          <p:cNvPr id="17" name="Content Placeholder 6">
             <a:extLst>
               <a:ext uri="{FF2B5EF4-FFF2-40B4-BE49-F238E27FC236}">
-                <a16:creationId xmlns:a16="http://schemas.microsoft.com/office/drawing/2014/main" id="{BDDD6BDC-E008-6AB7-55A1-46ED9BCF054F}"/>
+                <a16:creationId xmlns:a16="http://schemas.microsoft.com/office/drawing/2014/main" id="{FF8E358F-0FE6-412D-84BA-FA0CB3EBFD1A}"/>
               </a:ext>
             </a:extLst>
           </p:cNvPr>
@@ -22007,30 +22724,249 @@
             <a:spLocks noGrp="1"/>
           </p:cNvSpPr>
           <p:nvPr>
-            <p:ph idx="11"/>
+            <p:ph sz="quarter" idx="4"/>
           </p:nvPr>
         </p:nvSpPr>
         <p:spPr>
           <a:xfrm>
-            <a:off x="4364808" y="3808750"/>
-            <a:ext cx="7043618" cy="2233233"/>
+            <a:off x="5970665" y="2133220"/>
+            <a:ext cx="5888826" cy="2083980"/>
           </a:xfrm>
         </p:spPr>
         <p:txBody>
-          <a:bodyPr/>
+          <a:bodyPr>
+            <a:noAutofit/>
+          </a:bodyPr>
           <a:lstStyle/>
           <a:p>
             <a:r>
-              <a:rPr lang="en-US" dirty="0"/>
-              <a:t>Enhancing your presentation</a:t>
+              <a:rPr lang="en-US" sz="1600" b="1" dirty="0"/>
+              <a:t>Analysis:</a:t>
+            </a:r>
+          </a:p>
+          <a:p>
+            <a:r>
+              <a:rPr lang="en-US" sz="1400" dirty="0">
+                <a:solidFill>
+                  <a:schemeClr val="tx1">
+                    <a:lumMod val="75000"/>
+                    <a:lumOff val="25000"/>
+                  </a:schemeClr>
+                </a:solidFill>
+              </a:rPr>
+              <a:t>The fraud detection model achieved 96% accuracy and a ROC-AUC score of 0.78, showing a good ability to distinguish between fraud and non-fraud cases. </a:t>
+            </a:r>
+            <a:r>
+              <a:rPr lang="en-US" sz="1400" dirty="0">
+                <a:solidFill>
+                  <a:srgbClr val="202C8F"/>
+                </a:solidFill>
+              </a:rPr>
+              <a:t>It correctly identified 134 non-fraud and 1 fraud case but missed 5 actual frauds</a:t>
+            </a:r>
+            <a:r>
+              <a:rPr lang="en-US" sz="1400" dirty="0">
+                <a:solidFill>
+                  <a:schemeClr val="tx1">
+                    <a:lumMod val="75000"/>
+                    <a:lumOff val="25000"/>
+                  </a:schemeClr>
+                </a:solidFill>
+              </a:rPr>
+              <a:t>. While its precision for fraud is perfect (1.00), meaning every fraud prediction is correct, its recall is very low (0.17), indicating it detects only 17% of real frauds. The low F1-score (0.29) further reflects this imbalance, suggesting the model struggles to identify all fraudulent transactions due to the highly imbalanced dataset.</a:t>
             </a:r>
           </a:p>
         </p:txBody>
       </p:sp>
+      <p:pic>
+        <p:nvPicPr>
+          <p:cNvPr id="8" name="Picture 7">
+            <a:extLst>
+              <a:ext uri="{FF2B5EF4-FFF2-40B4-BE49-F238E27FC236}">
+                <a16:creationId xmlns:a16="http://schemas.microsoft.com/office/drawing/2014/main" id="{4CB72E60-741A-AA56-2F58-D759FA9E6A03}"/>
+              </a:ext>
+            </a:extLst>
+          </p:cNvPr>
+          <p:cNvPicPr>
+            <a:picLocks noChangeAspect="1"/>
+          </p:cNvPicPr>
+          <p:nvPr/>
+        </p:nvPicPr>
+        <p:blipFill>
+          <a:blip r:embed="rId3"/>
+          <a:stretch>
+            <a:fillRect/>
+          </a:stretch>
+        </p:blipFill>
+        <p:spPr>
+          <a:xfrm>
+            <a:off x="914399" y="2133220"/>
+            <a:ext cx="2337848" cy="2032724"/>
+          </a:xfrm>
+          <a:prstGeom prst="rect">
+            <a:avLst/>
+          </a:prstGeom>
+          <a:ln>
+            <a:solidFill>
+              <a:schemeClr val="bg2">
+                <a:lumMod val="90000"/>
+              </a:schemeClr>
+            </a:solidFill>
+          </a:ln>
+        </p:spPr>
+      </p:pic>
+      <p:pic>
+        <p:nvPicPr>
+          <p:cNvPr id="14" name="Picture 13">
+            <a:extLst>
+              <a:ext uri="{FF2B5EF4-FFF2-40B4-BE49-F238E27FC236}">
+                <a16:creationId xmlns:a16="http://schemas.microsoft.com/office/drawing/2014/main" id="{9F73CC5C-D368-29BB-3107-4EA673238268}"/>
+              </a:ext>
+            </a:extLst>
+          </p:cNvPr>
+          <p:cNvPicPr>
+            <a:picLocks noChangeAspect="1"/>
+          </p:cNvPicPr>
+          <p:nvPr/>
+        </p:nvPicPr>
+        <p:blipFill>
+          <a:blip r:embed="rId4"/>
+          <a:stretch>
+            <a:fillRect/>
+          </a:stretch>
+        </p:blipFill>
+        <p:spPr>
+          <a:xfrm>
+            <a:off x="3365125" y="2133220"/>
+            <a:ext cx="2286277" cy="2032724"/>
+          </a:xfrm>
+          <a:prstGeom prst="rect">
+            <a:avLst/>
+          </a:prstGeom>
+          <a:ln>
+            <a:solidFill>
+              <a:schemeClr val="bg2">
+                <a:lumMod val="90000"/>
+              </a:schemeClr>
+            </a:solidFill>
+          </a:ln>
+        </p:spPr>
+      </p:pic>
+      <p:pic>
+        <p:nvPicPr>
+          <p:cNvPr id="18" name="Picture 17">
+            <a:extLst>
+              <a:ext uri="{FF2B5EF4-FFF2-40B4-BE49-F238E27FC236}">
+                <a16:creationId xmlns:a16="http://schemas.microsoft.com/office/drawing/2014/main" id="{1D7A0271-7743-11F1-7325-BC672B6FCB11}"/>
+              </a:ext>
+            </a:extLst>
+          </p:cNvPr>
+          <p:cNvPicPr>
+            <a:picLocks noChangeAspect="1"/>
+          </p:cNvPicPr>
+          <p:nvPr/>
+        </p:nvPicPr>
+        <p:blipFill>
+          <a:blip r:embed="rId5"/>
+          <a:stretch>
+            <a:fillRect/>
+          </a:stretch>
+        </p:blipFill>
+        <p:spPr>
+          <a:xfrm>
+            <a:off x="914399" y="4436889"/>
+            <a:ext cx="2337847" cy="2083981"/>
+          </a:xfrm>
+          <a:prstGeom prst="rect">
+            <a:avLst/>
+          </a:prstGeom>
+          <a:ln>
+            <a:solidFill>
+              <a:schemeClr val="bg2">
+                <a:lumMod val="90000"/>
+              </a:schemeClr>
+            </a:solidFill>
+          </a:ln>
+        </p:spPr>
+      </p:pic>
+      <p:pic>
+        <p:nvPicPr>
+          <p:cNvPr id="20" name="Picture 19">
+            <a:extLst>
+              <a:ext uri="{FF2B5EF4-FFF2-40B4-BE49-F238E27FC236}">
+                <a16:creationId xmlns:a16="http://schemas.microsoft.com/office/drawing/2014/main" id="{977AA83F-6561-6BBD-23E0-96E71AA61B22}"/>
+              </a:ext>
+            </a:extLst>
+          </p:cNvPr>
+          <p:cNvPicPr>
+            <a:picLocks noChangeAspect="1"/>
+          </p:cNvPicPr>
+          <p:nvPr/>
+        </p:nvPicPr>
+        <p:blipFill>
+          <a:blip r:embed="rId6"/>
+          <a:stretch>
+            <a:fillRect/>
+          </a:stretch>
+        </p:blipFill>
+        <p:spPr>
+          <a:xfrm>
+            <a:off x="3365125" y="4436890"/>
+            <a:ext cx="2286277" cy="2083980"/>
+          </a:xfrm>
+          <a:prstGeom prst="rect">
+            <a:avLst/>
+          </a:prstGeom>
+          <a:ln>
+            <a:solidFill>
+              <a:schemeClr val="bg2">
+                <a:lumMod val="90000"/>
+              </a:schemeClr>
+            </a:solidFill>
+          </a:ln>
+        </p:spPr>
+      </p:pic>
+      <p:pic>
+        <p:nvPicPr>
+          <p:cNvPr id="22" name="Picture 21">
+            <a:extLst>
+              <a:ext uri="{FF2B5EF4-FFF2-40B4-BE49-F238E27FC236}">
+                <a16:creationId xmlns:a16="http://schemas.microsoft.com/office/drawing/2014/main" id="{D07AE3C6-0F69-AE25-6AD4-8918842D6DB9}"/>
+              </a:ext>
+            </a:extLst>
+          </p:cNvPr>
+          <p:cNvPicPr>
+            <a:picLocks noChangeAspect="1"/>
+          </p:cNvPicPr>
+          <p:nvPr/>
+        </p:nvPicPr>
+        <p:blipFill>
+          <a:blip r:embed="rId7"/>
+          <a:stretch>
+            <a:fillRect/>
+          </a:stretch>
+        </p:blipFill>
+        <p:spPr>
+          <a:xfrm>
+            <a:off x="5970665" y="4436889"/>
+            <a:ext cx="3542790" cy="2083980"/>
+          </a:xfrm>
+          <a:prstGeom prst="rect">
+            <a:avLst/>
+          </a:prstGeom>
+          <a:ln>
+            <a:solidFill>
+              <a:schemeClr val="bg2">
+                <a:lumMod val="90000"/>
+              </a:schemeClr>
+            </a:solidFill>
+          </a:ln>
+        </p:spPr>
+      </p:pic>
     </p:spTree>
     <p:extLst>
       <p:ext uri="{BB962C8B-B14F-4D97-AF65-F5344CB8AC3E}">
-        <p14:creationId xmlns:p14="http://schemas.microsoft.com/office/powerpoint/2010/main" val="1131718056"/>
+        <p14:creationId xmlns:p14="http://schemas.microsoft.com/office/powerpoint/2010/main" val="4027339319"/>
       </p:ext>
     </p:extLst>
   </p:cSld>
@@ -22832,35 +23768,6 @@
 </file>
 
 <file path=customXml/item1.xml><?xml version="1.0" encoding="utf-8"?>
-<p:properties xmlns:p="http://schemas.microsoft.com/office/2006/metadata/properties" xmlns:xsi="http://www.w3.org/2001/XMLSchema-instance" xmlns:pc="http://schemas.microsoft.com/office/infopath/2007/PartnerControls">
-  <documentManagement>
-    <_ip_UnifiedCompliancePolicyUIAction xmlns="http://schemas.microsoft.com/sharepoint/v3" xsi:nil="true"/>
-    <Image xmlns="71af3243-3dd4-4a8d-8c0d-dd76da1f02a5">
-      <Url xsi:nil="true"/>
-      <Description xsi:nil="true"/>
-    </Image>
-    <Status xmlns="71af3243-3dd4-4a8d-8c0d-dd76da1f02a5">Not started</Status>
-    <Background xmlns="71af3243-3dd4-4a8d-8c0d-dd76da1f02a5">false</Background>
-    <_ip_UnifiedCompliancePolicyProperties xmlns="http://schemas.microsoft.com/sharepoint/v3" xsi:nil="true"/>
-    <ImageTagsTaxHTField xmlns="71af3243-3dd4-4a8d-8c0d-dd76da1f02a5">
-      <Terms xmlns="http://schemas.microsoft.com/office/infopath/2007/PartnerControls"/>
-    </ImageTagsTaxHTField>
-    <TaxCatchAll xmlns="230e9df3-be65-4c73-a93b-d1236ebd677e" xsi:nil="true"/>
-    <MediaServiceKeyPoints xmlns="71af3243-3dd4-4a8d-8c0d-dd76da1f02a5" xsi:nil="true"/>
-  </documentManagement>
-</p:properties>
-</file>
-
-<file path=customXml/item2.xml><?xml version="1.0" encoding="utf-8"?>
-<?mso-contentType ?>
-<FormTemplates xmlns="http://schemas.microsoft.com/sharepoint/v3/contenttype/forms">
-  <Display>DocumentLibraryForm</Display>
-  <Edit>DocumentLibraryForm</Edit>
-  <New>DocumentLibraryForm</New>
-</FormTemplates>
-</file>
-
-<file path=customXml/item3.xml><?xml version="1.0" encoding="utf-8"?>
 <ct:contentTypeSchema xmlns:ct="http://schemas.microsoft.com/office/2006/metadata/contentType" xmlns:ma="http://schemas.microsoft.com/office/2006/metadata/properties/metaAttributes" ct:_="" ma:_="" ma:contentTypeName="Document" ma:contentTypeID="0x01010079F111ED35F8CC479449609E8A0923A6" ma:contentTypeVersion="28" ma:contentTypeDescription="Create a new document." ma:contentTypeScope="" ma:versionID="60f5a4f2d2b0abadcf532d48ebf9cb71">
   <xsd:schema xmlns:xsd="http://www.w3.org/2001/XMLSchema" xmlns:xs="http://www.w3.org/2001/XMLSchema" xmlns:p="http://schemas.microsoft.com/office/2006/metadata/properties" xmlns:ns1="http://schemas.microsoft.com/sharepoint/v3" xmlns:ns2="71af3243-3dd4-4a8d-8c0d-dd76da1f02a5" xmlns:ns3="16c05727-aa75-4e4a-9b5f-8a80a1165891" xmlns:ns4="230e9df3-be65-4c73-a93b-d1236ebd677e" targetNamespace="http://schemas.microsoft.com/office/2006/metadata/properties" ma:root="true" ma:fieldsID="7dd78129e6a1811f84807ad11c651531" ns1:_="" ns2:_="" ns3:_="" ns4:_="">
     <xsd:import namespace="http://schemas.microsoft.com/sharepoint/v3"/>
@@ -23172,27 +24079,36 @@
 </ct:contentTypeSchema>
 </file>
 
-<file path=customXml/itemProps1.xml><?xml version="1.0" encoding="utf-8"?>
-<ds:datastoreItem xmlns:ds="http://schemas.openxmlformats.org/officeDocument/2006/customXml" ds:itemID="{BA719FA4-954C-4FA8-82CB-206659C3B826}">
-  <ds:schemaRefs>
-    <ds:schemaRef ds:uri="http://schemas.microsoft.com/office/2006/metadata/properties"/>
-    <ds:schemaRef ds:uri="http://schemas.microsoft.com/office/infopath/2007/PartnerControls"/>
-    <ds:schemaRef ds:uri="http://schemas.microsoft.com/sharepoint/v3"/>
-    <ds:schemaRef ds:uri="71af3243-3dd4-4a8d-8c0d-dd76da1f02a5"/>
-    <ds:schemaRef ds:uri="230e9df3-be65-4c73-a93b-d1236ebd677e"/>
-  </ds:schemaRefs>
-</ds:datastoreItem>
+<file path=customXml/item2.xml><?xml version="1.0" encoding="utf-8"?>
+<?mso-contentType ?>
+<FormTemplates xmlns="http://schemas.microsoft.com/sharepoint/v3/contenttype/forms">
+  <Display>DocumentLibraryForm</Display>
+  <Edit>DocumentLibraryForm</Edit>
+  <New>DocumentLibraryForm</New>
+</FormTemplates>
 </file>
 
-<file path=customXml/itemProps2.xml><?xml version="1.0" encoding="utf-8"?>
-<ds:datastoreItem xmlns:ds="http://schemas.openxmlformats.org/officeDocument/2006/customXml" ds:itemID="{16DBB56F-4362-4386-A1A1-3DF898896616}">
-  <ds:schemaRefs>
-    <ds:schemaRef ds:uri="http://schemas.microsoft.com/sharepoint/v3/contenttype/forms"/>
-  </ds:schemaRefs>
-</ds:datastoreItem>
+<file path=customXml/item3.xml><?xml version="1.0" encoding="utf-8"?>
+<p:properties xmlns:p="http://schemas.microsoft.com/office/2006/metadata/properties" xmlns:xsi="http://www.w3.org/2001/XMLSchema-instance" xmlns:pc="http://schemas.microsoft.com/office/infopath/2007/PartnerControls">
+  <documentManagement>
+    <_ip_UnifiedCompliancePolicyUIAction xmlns="http://schemas.microsoft.com/sharepoint/v3" xsi:nil="true"/>
+    <Image xmlns="71af3243-3dd4-4a8d-8c0d-dd76da1f02a5">
+      <Url xsi:nil="true"/>
+      <Description xsi:nil="true"/>
+    </Image>
+    <Status xmlns="71af3243-3dd4-4a8d-8c0d-dd76da1f02a5">Not started</Status>
+    <Background xmlns="71af3243-3dd4-4a8d-8c0d-dd76da1f02a5">false</Background>
+    <_ip_UnifiedCompliancePolicyProperties xmlns="http://schemas.microsoft.com/sharepoint/v3" xsi:nil="true"/>
+    <ImageTagsTaxHTField xmlns="71af3243-3dd4-4a8d-8c0d-dd76da1f02a5">
+      <Terms xmlns="http://schemas.microsoft.com/office/infopath/2007/PartnerControls"/>
+    </ImageTagsTaxHTField>
+    <TaxCatchAll xmlns="230e9df3-be65-4c73-a93b-d1236ebd677e" xsi:nil="true"/>
+    <MediaServiceKeyPoints xmlns="71af3243-3dd4-4a8d-8c0d-dd76da1f02a5" xsi:nil="true"/>
+  </documentManagement>
+</p:properties>
 </file>
 
-<file path=customXml/itemProps3.xml><?xml version="1.0" encoding="utf-8"?>
+<file path=customXml/itemProps1.xml><?xml version="1.0" encoding="utf-8"?>
 <ds:datastoreItem xmlns:ds="http://schemas.openxmlformats.org/officeDocument/2006/customXml" ds:itemID="{04948363-B267-4BAC-8655-100FBEC280C1}">
   <ds:schemaRefs>
     <ds:schemaRef ds:uri="http://schemas.microsoft.com/office/2006/metadata/contentType"/>
@@ -23213,6 +24129,26 @@
 </ds:datastoreItem>
 </file>
 
+<file path=customXml/itemProps2.xml><?xml version="1.0" encoding="utf-8"?>
+<ds:datastoreItem xmlns:ds="http://schemas.openxmlformats.org/officeDocument/2006/customXml" ds:itemID="{16DBB56F-4362-4386-A1A1-3DF898896616}">
+  <ds:schemaRefs>
+    <ds:schemaRef ds:uri="http://schemas.microsoft.com/sharepoint/v3/contenttype/forms"/>
+  </ds:schemaRefs>
+</ds:datastoreItem>
+</file>
+
+<file path=customXml/itemProps3.xml><?xml version="1.0" encoding="utf-8"?>
+<ds:datastoreItem xmlns:ds="http://schemas.openxmlformats.org/officeDocument/2006/customXml" ds:itemID="{BA719FA4-954C-4FA8-82CB-206659C3B826}">
+  <ds:schemaRefs>
+    <ds:schemaRef ds:uri="http://schemas.microsoft.com/office/2006/metadata/properties"/>
+    <ds:schemaRef ds:uri="http://schemas.microsoft.com/office/infopath/2007/PartnerControls"/>
+    <ds:schemaRef ds:uri="http://schemas.microsoft.com/sharepoint/v3"/>
+    <ds:schemaRef ds:uri="71af3243-3dd4-4a8d-8c0d-dd76da1f02a5"/>
+    <ds:schemaRef ds:uri="230e9df3-be65-4c73-a93b-d1236ebd677e"/>
+  </ds:schemaRefs>
+</ds:datastoreItem>
+</file>
+
 <file path=docMetadata/LabelInfo.xml><?xml version="1.0" encoding="utf-8"?>
 <clbl:labelList xmlns:clbl="http://schemas.microsoft.com/office/2020/mipLabelMetadata"/>
 </file>
</xml_diff>

<commit_message>
Presenation and PBI Dashboard
</commit_message>
<xml_diff>
--- a/docs/presentation_v1.0.pptx
+++ b/docs/presentation_v1.0.pptx
@@ -22110,7 +22110,7 @@
         </p:nvSpPr>
         <p:spPr>
           <a:xfrm>
-            <a:off x="4308049" y="2303028"/>
+            <a:off x="7183224" y="2296489"/>
             <a:ext cx="4402814" cy="4335516"/>
           </a:xfrm>
         </p:spPr>
@@ -22518,7 +22518,7 @@
         </p:blipFill>
         <p:spPr>
           <a:xfrm>
-            <a:off x="9193204" y="3939619"/>
+            <a:off x="4172241" y="4240846"/>
             <a:ext cx="2812868" cy="1171043"/>
           </a:xfrm>
           <a:prstGeom prst="rect">
@@ -22555,7 +22555,7 @@
         </p:blipFill>
         <p:spPr>
           <a:xfrm>
-            <a:off x="9193204" y="2001801"/>
+            <a:off x="4172241" y="2303028"/>
             <a:ext cx="2812868" cy="1818722"/>
           </a:xfrm>
           <a:prstGeom prst="rect">
@@ -22592,7 +22592,7 @@
         </p:blipFill>
         <p:spPr>
           <a:xfrm>
-            <a:off x="9193204" y="5229758"/>
+            <a:off x="4172241" y="5530985"/>
             <a:ext cx="2812868" cy="1171043"/>
           </a:xfrm>
           <a:prstGeom prst="rect">
@@ -24080,15 +24080,6 @@
 </file>
 
 <file path=customXml/item2.xml><?xml version="1.0" encoding="utf-8"?>
-<?mso-contentType ?>
-<FormTemplates xmlns="http://schemas.microsoft.com/sharepoint/v3/contenttype/forms">
-  <Display>DocumentLibraryForm</Display>
-  <Edit>DocumentLibraryForm</Edit>
-  <New>DocumentLibraryForm</New>
-</FormTemplates>
-</file>
-
-<file path=customXml/item3.xml><?xml version="1.0" encoding="utf-8"?>
 <p:properties xmlns:p="http://schemas.microsoft.com/office/2006/metadata/properties" xmlns:xsi="http://www.w3.org/2001/XMLSchema-instance" xmlns:pc="http://schemas.microsoft.com/office/infopath/2007/PartnerControls">
   <documentManagement>
     <_ip_UnifiedCompliancePolicyUIAction xmlns="http://schemas.microsoft.com/sharepoint/v3" xsi:nil="true"/>
@@ -24106,6 +24097,15 @@
     <MediaServiceKeyPoints xmlns="71af3243-3dd4-4a8d-8c0d-dd76da1f02a5" xsi:nil="true"/>
   </documentManagement>
 </p:properties>
+</file>
+
+<file path=customXml/item3.xml><?xml version="1.0" encoding="utf-8"?>
+<?mso-contentType ?>
+<FormTemplates xmlns="http://schemas.microsoft.com/sharepoint/v3/contenttype/forms">
+  <Display>DocumentLibraryForm</Display>
+  <Edit>DocumentLibraryForm</Edit>
+  <New>DocumentLibraryForm</New>
+</FormTemplates>
 </file>
 
 <file path=customXml/itemProps1.xml><?xml version="1.0" encoding="utf-8"?>
@@ -24130,14 +24130,6 @@
 </file>
 
 <file path=customXml/itemProps2.xml><?xml version="1.0" encoding="utf-8"?>
-<ds:datastoreItem xmlns:ds="http://schemas.openxmlformats.org/officeDocument/2006/customXml" ds:itemID="{16DBB56F-4362-4386-A1A1-3DF898896616}">
-  <ds:schemaRefs>
-    <ds:schemaRef ds:uri="http://schemas.microsoft.com/sharepoint/v3/contenttype/forms"/>
-  </ds:schemaRefs>
-</ds:datastoreItem>
-</file>
-
-<file path=customXml/itemProps3.xml><?xml version="1.0" encoding="utf-8"?>
 <ds:datastoreItem xmlns:ds="http://schemas.openxmlformats.org/officeDocument/2006/customXml" ds:itemID="{BA719FA4-954C-4FA8-82CB-206659C3B826}">
   <ds:schemaRefs>
     <ds:schemaRef ds:uri="http://schemas.microsoft.com/office/2006/metadata/properties"/>
@@ -24149,6 +24141,14 @@
 </ds:datastoreItem>
 </file>
 
+<file path=customXml/itemProps3.xml><?xml version="1.0" encoding="utf-8"?>
+<ds:datastoreItem xmlns:ds="http://schemas.openxmlformats.org/officeDocument/2006/customXml" ds:itemID="{16DBB56F-4362-4386-A1A1-3DF898896616}">
+  <ds:schemaRefs>
+    <ds:schemaRef ds:uri="http://schemas.microsoft.com/sharepoint/v3/contenttype/forms"/>
+  </ds:schemaRefs>
+</ds:datastoreItem>
+</file>
+
 <file path=docMetadata/LabelInfo.xml><?xml version="1.0" encoding="utf-8"?>
 <clbl:labelList xmlns:clbl="http://schemas.microsoft.com/office/2020/mipLabelMetadata"/>
 </file>
</xml_diff>